<commit_message>
more fixes to packing instructions
</commit_message>
<xml_diff>
--- a/assignments/hw7/HW7-DANNEMILLER-MARK-COMMERCIAL-MP.pptx
+++ b/assignments/hw7/HW7-DANNEMILLER-MARK-COMMERCIAL-MP.pptx
@@ -220,7 +220,7 @@
           <a:p>
             <a:fld id="{656B1857-7F2F-4FA5-AC91-CA6CB406E5ED}" type="datetimeFigureOut">
               <a:rPr lang="en-US" smtClean="0"/>
-              <a:t>4/24/2025</a:t>
+              <a:t>4/29/2025</a:t>
             </a:fld>
             <a:endParaRPr lang="en-US" dirty="0"/>
           </a:p>
@@ -15964,12 +15964,9 @@
             </a:r>
             <a:r>
               <a:rPr lang="en-US" b="1" dirty="0"/>
-              <a:t>Harvard buses</a:t>
-            </a:r>
-            <a:r>
-              <a:rPr lang="en-US" dirty="0"/>
-              <a:t> internally</a:t>
-            </a:r>
+              <a:t>Modified Harvard bus</a:t>
+            </a:r>
+            <a:endParaRPr lang="en-US" dirty="0"/>
           </a:p>
         </p:txBody>
       </p:sp>
@@ -16215,13 +16212,13 @@
         </p:spPr>
         <p:txBody>
           <a:bodyPr>
-            <a:normAutofit fontScale="90000"/>
+            <a:normAutofit/>
           </a:bodyPr>
           <a:lstStyle/>
           <a:p>
             <a:r>
-              <a:rPr lang="en-US" dirty="0"/>
-              <a:t>Mem Access &amp; Addressing</a:t>
+              <a:rPr lang="en-US" sz="4000" dirty="0"/>
+              <a:t>Mem Addressing &amp; Stack</a:t>
             </a:r>
           </a:p>
         </p:txBody>
@@ -16244,13 +16241,13 @@
         </p:nvSpPr>
         <p:spPr>
           <a:xfrm>
-            <a:off x="474215" y="2874835"/>
-            <a:ext cx="4984628" cy="2197908"/>
+            <a:off x="474215" y="2559245"/>
+            <a:ext cx="4984628" cy="4162229"/>
           </a:xfrm>
         </p:spPr>
         <p:txBody>
           <a:bodyPr>
-            <a:normAutofit fontScale="92500" lnSpcReduction="10000"/>
+            <a:normAutofit lnSpcReduction="10000"/>
           </a:bodyPr>
           <a:lstStyle/>
           <a:p>
@@ -16298,8 +16295,52 @@
             </a:pPr>
             <a:r>
               <a:rPr lang="en-US" dirty="0"/>
-              <a:t>8‑, 16‑, 32‑bit transfers, unaligned supported</a:t>
-            </a:r>
+              <a:t>8‑, 16‑, 32‑bit transfers (multiple instructions), unaligned supported</a:t>
+            </a:r>
+          </a:p>
+          <a:p>
+            <a:pPr marL="285750" indent="-285750">
+              <a:buFont typeface="Arial" panose="020B0604020202020204" pitchFamily="34" charset="0"/>
+              <a:buChar char="•"/>
+            </a:pPr>
+            <a:endParaRPr lang="en-US" dirty="0"/>
+          </a:p>
+          <a:p>
+            <a:pPr marL="285750" indent="-285750">
+              <a:buFont typeface="Arial" panose="020B0604020202020204" pitchFamily="34" charset="0"/>
+              <a:buChar char="•"/>
+            </a:pPr>
+            <a:r>
+              <a:rPr lang="en-US" dirty="0"/>
+              <a:t>Full‑descending stack, 8‑byte aligned</a:t>
+            </a:r>
+          </a:p>
+          <a:p>
+            <a:pPr marL="285750" indent="-285750">
+              <a:buFont typeface="Arial" panose="020B0604020202020204" pitchFamily="34" charset="0"/>
+              <a:buChar char="•"/>
+            </a:pPr>
+            <a:r>
+              <a:rPr lang="en-US" dirty="0"/>
+              <a:t>MSP for ISR/privileged, PSP for tasks</a:t>
+            </a:r>
+          </a:p>
+          <a:p>
+            <a:pPr marL="285750" indent="-285750">
+              <a:buFont typeface="Arial" panose="020B0604020202020204" pitchFamily="34" charset="0"/>
+              <a:buChar char="•"/>
+            </a:pPr>
+            <a:r>
+              <a:rPr lang="en-US" dirty="0"/>
+              <a:t>On interrupt: HW push R0‑R3,R12,LR,PC,xPSR (+ FP regs if active)</a:t>
+            </a:r>
+          </a:p>
+          <a:p>
+            <a:pPr marL="285750" indent="-285750">
+              <a:buFont typeface="Arial" panose="020B0604020202020204" pitchFamily="34" charset="0"/>
+              <a:buChar char="•"/>
+            </a:pPr>
+            <a:endParaRPr lang="en-US" dirty="0"/>
           </a:p>
         </p:txBody>
       </p:sp>
@@ -16363,10 +16404,10 @@
       </p:sp>
       <p:sp>
         <p:nvSpPr>
-          <p:cNvPr id="8" name="Title 1">
-            <a:extLst>
-              <a:ext uri="{FF2B5EF4-FFF2-40B4-BE49-F238E27FC236}">
-                <a16:creationId xmlns:a16="http://schemas.microsoft.com/office/drawing/2014/main" id="{76C965C0-1276-EFC9-E270-C11E66BD9C5C}"/>
+          <p:cNvPr id="9" name="Text Placeholder 2">
+            <a:extLst>
+              <a:ext uri="{FF2B5EF4-FFF2-40B4-BE49-F238E27FC236}">
+                <a16:creationId xmlns:a16="http://schemas.microsoft.com/office/drawing/2014/main" id="{0D21C476-A925-0704-C1AB-C6932104987B}"/>
               </a:ext>
             </a:extLst>
           </p:cNvPr>
@@ -16377,61 +16418,7 @@
         </p:nvSpPr>
         <p:spPr>
           <a:xfrm>
-            <a:off x="6369172" y="989032"/>
-            <a:ext cx="4984628" cy="1491339"/>
-          </a:xfrm>
-          <a:prstGeom prst="rect">
-            <a:avLst/>
-          </a:prstGeom>
-        </p:spPr>
-        <p:txBody>
-          <a:bodyPr vert="horz" lIns="91440" tIns="45720" rIns="91440" bIns="45720" rtlCol="0" anchor="b">
-            <a:normAutofit fontScale="97500" lnSpcReduction="10000"/>
-          </a:bodyPr>
-          <a:lstStyle>
-            <a:lvl1pPr algn="l" defTabSz="914400" rtl="0" eaLnBrk="1" latinLnBrk="0" hangingPunct="1">
-              <a:lnSpc>
-                <a:spcPct val="90000"/>
-              </a:lnSpc>
-              <a:spcBef>
-                <a:spcPct val="0"/>
-              </a:spcBef>
-              <a:buNone/>
-              <a:defRPr sz="5400" kern="1200">
-                <a:solidFill>
-                  <a:schemeClr val="tx1"/>
-                </a:solidFill>
-                <a:latin typeface="+mj-lt"/>
-                <a:ea typeface="+mj-ea"/>
-                <a:cs typeface="+mj-cs"/>
-              </a:defRPr>
-            </a:lvl1pPr>
-          </a:lstStyle>
-          <a:p>
-            <a:r>
-              <a:rPr lang="en-US" dirty="0"/>
-              <a:t>Stacks and Context</a:t>
-            </a:r>
-          </a:p>
-        </p:txBody>
-      </p:sp>
-      <p:sp>
-        <p:nvSpPr>
-          <p:cNvPr id="9" name="Text Placeholder 2">
-            <a:extLst>
-              <a:ext uri="{FF2B5EF4-FFF2-40B4-BE49-F238E27FC236}">
-                <a16:creationId xmlns:a16="http://schemas.microsoft.com/office/drawing/2014/main" id="{0D21C476-A925-0704-C1AB-C6932104987B}"/>
-              </a:ext>
-            </a:extLst>
-          </p:cNvPr>
-          <p:cNvSpPr txBox="1">
-            <a:spLocks/>
-          </p:cNvSpPr>
-          <p:nvPr/>
-        </p:nvSpPr>
-        <p:spPr>
-          <a:xfrm>
-            <a:off x="6369172" y="2845496"/>
+            <a:off x="6369172" y="2636962"/>
             <a:ext cx="4984628" cy="1835361"/>
           </a:xfrm>
           <a:prstGeom prst="rect">
@@ -16611,30 +16598,7 @@
               <a:buFont typeface="Arial" panose="020B0604020202020204" pitchFamily="34" charset="0"/>
               <a:buChar char="•"/>
             </a:pPr>
-            <a:r>
-              <a:rPr lang="en-US" dirty="0"/>
-              <a:t>Full‑descending stack, 8‑byte aligned</a:t>
-            </a:r>
-          </a:p>
-          <a:p>
-            <a:pPr marL="285750" indent="-285750">
-              <a:buFont typeface="Arial" panose="020B0604020202020204" pitchFamily="34" charset="0"/>
-              <a:buChar char="•"/>
-            </a:pPr>
-            <a:r>
-              <a:rPr lang="en-US" dirty="0"/>
-              <a:t>MSP for ISR/privileged, PSP for tasks</a:t>
-            </a:r>
-          </a:p>
-          <a:p>
-            <a:pPr marL="285750" indent="-285750">
-              <a:buFont typeface="Arial" panose="020B0604020202020204" pitchFamily="34" charset="0"/>
-              <a:buChar char="•"/>
-            </a:pPr>
-            <a:r>
-              <a:rPr lang="en-US" dirty="0"/>
-              <a:t>On interrupt: HW push R0‑R3,R12,LR,PC,xPSR (+ FP regs if active)</a:t>
-            </a:r>
+            <a:endParaRPr lang="en-US" dirty="0"/>
           </a:p>
         </p:txBody>
       </p:sp>
@@ -16652,7 +16616,7 @@
         </p:nvSpPr>
         <p:spPr>
           <a:xfrm>
-            <a:off x="6208614" y="5045982"/>
+            <a:off x="6208614" y="5280651"/>
             <a:ext cx="6105440" cy="646331"/>
           </a:xfrm>
           <a:prstGeom prst="rect">
@@ -16688,6 +16652,36 @@
           </a:p>
         </p:txBody>
       </p:sp>
+      <p:pic>
+        <p:nvPicPr>
+          <p:cNvPr id="10" name="Picture 9">
+            <a:extLst>
+              <a:ext uri="{FF2B5EF4-FFF2-40B4-BE49-F238E27FC236}">
+                <a16:creationId xmlns:a16="http://schemas.microsoft.com/office/drawing/2014/main" id="{11AC517C-5CEC-52C6-F774-7D3B7F7AA70B}"/>
+              </a:ext>
+            </a:extLst>
+          </p:cNvPr>
+          <p:cNvPicPr>
+            <a:picLocks noChangeAspect="1"/>
+          </p:cNvPicPr>
+          <p:nvPr/>
+        </p:nvPicPr>
+        <p:blipFill>
+          <a:blip r:embed="rId3"/>
+          <a:stretch>
+            <a:fillRect/>
+          </a:stretch>
+        </p:blipFill>
+        <p:spPr>
+          <a:xfrm>
+            <a:off x="6527226" y="1601059"/>
+            <a:ext cx="4668519" cy="3067564"/>
+          </a:xfrm>
+          <a:prstGeom prst="rect">
+            <a:avLst/>
+          </a:prstGeom>
+        </p:spPr>
+      </p:pic>
     </p:spTree>
     <p:extLst>
       <p:ext uri="{BB962C8B-B14F-4D97-AF65-F5344CB8AC3E}">
@@ -17823,7 +17817,7 @@
           <a:p>
             <a:r>
               <a:rPr lang="en-US" dirty="0"/>
-              <a:t>~150 + DSP + FPU mnemonics (~300 encodings)</a:t>
+              <a:t>~150 + DSP + FPU mnemonics (&gt;200 encodings)</a:t>
             </a:r>
           </a:p>
           <a:p>
@@ -17839,7 +17833,7 @@
             </a:r>
             <a:r>
               <a:rPr lang="en-US" dirty="0"/>
-              <a:t>; IT blocks for 4‑deep exec</a:t>
+              <a:t>; Blocks for 4‑deep exec</a:t>
             </a:r>
           </a:p>
         </p:txBody>
@@ -23990,6 +23984,25 @@
 </file>
 
 <file path=customXml/item2.xml><?xml version="1.0" encoding="utf-8"?>
+<p:properties xmlns:p="http://schemas.microsoft.com/office/2006/metadata/properties" xmlns:xsi="http://www.w3.org/2001/XMLSchema-instance" xmlns:pc="http://schemas.microsoft.com/office/infopath/2007/PartnerControls">
+  <documentManagement>
+    <Status xmlns="71af3243-3dd4-4a8d-8c0d-dd76da1f02a5">Not started</Status>
+    <_ip_UnifiedCompliancePolicyUIAction xmlns="http://schemas.microsoft.com/sharepoint/v3" xsi:nil="true"/>
+    <Image xmlns="71af3243-3dd4-4a8d-8c0d-dd76da1f02a5">
+      <Url xsi:nil="true"/>
+      <Description xsi:nil="true"/>
+    </Image>
+    <_ip_UnifiedCompliancePolicyProperties xmlns="http://schemas.microsoft.com/sharepoint/v3" xsi:nil="true"/>
+    <ImageTagsTaxHTField xmlns="71af3243-3dd4-4a8d-8c0d-dd76da1f02a5">
+      <Terms xmlns="http://schemas.microsoft.com/office/infopath/2007/PartnerControls"/>
+    </ImageTagsTaxHTField>
+    <TaxCatchAll xmlns="230e9df3-be65-4c73-a93b-d1236ebd677e"/>
+    <MediaServiceKeyPoints xmlns="71af3243-3dd4-4a8d-8c0d-dd76da1f02a5" xsi:nil="true"/>
+  </documentManagement>
+</p:properties>
+</file>
+
+<file path=customXml/item3.xml><?xml version="1.0" encoding="utf-8"?>
 <ct:contentTypeSchema xmlns:ct="http://schemas.microsoft.com/office/2006/metadata/contentType" xmlns:ma="http://schemas.microsoft.com/office/2006/metadata/properties/metaAttributes" ct:_="" ma:_="" ma:contentTypeName="Document" ma:contentTypeID="0x01010079F111ED35F8CC479449609E8A0923A6" ma:contentTypeVersion="20" ma:contentTypeDescription="Create a new document." ma:contentTypeScope="" ma:versionID="1267097ee5f5874adfcc408041ae252e">
   <xsd:schema xmlns:xsd="http://www.w3.org/2001/XMLSchema" xmlns:xs="http://www.w3.org/2001/XMLSchema" xmlns:p="http://schemas.microsoft.com/office/2006/metadata/properties" xmlns:ns1="http://schemas.microsoft.com/sharepoint/v3" xmlns:ns2="71af3243-3dd4-4a8d-8c0d-dd76da1f02a5" xmlns:ns3="16c05727-aa75-4e4a-9b5f-8a80a1165891" xmlns:ns4="230e9df3-be65-4c73-a93b-d1236ebd677e" targetNamespace="http://schemas.microsoft.com/office/2006/metadata/properties" ma:root="true" ma:fieldsID="395891a93df65b14727750f2c06c306c" ns1:_="" ns2:_="" ns3:_="" ns4:_="">
     <xsd:import namespace="http://schemas.microsoft.com/sharepoint/v3"/>
@@ -24265,25 +24278,6 @@
 </ct:contentTypeSchema>
 </file>
 
-<file path=customXml/item3.xml><?xml version="1.0" encoding="utf-8"?>
-<p:properties xmlns:p="http://schemas.microsoft.com/office/2006/metadata/properties" xmlns:xsi="http://www.w3.org/2001/XMLSchema-instance" xmlns:pc="http://schemas.microsoft.com/office/infopath/2007/PartnerControls">
-  <documentManagement>
-    <Status xmlns="71af3243-3dd4-4a8d-8c0d-dd76da1f02a5">Not started</Status>
-    <_ip_UnifiedCompliancePolicyUIAction xmlns="http://schemas.microsoft.com/sharepoint/v3" xsi:nil="true"/>
-    <Image xmlns="71af3243-3dd4-4a8d-8c0d-dd76da1f02a5">
-      <Url xsi:nil="true"/>
-      <Description xsi:nil="true"/>
-    </Image>
-    <_ip_UnifiedCompliancePolicyProperties xmlns="http://schemas.microsoft.com/sharepoint/v3" xsi:nil="true"/>
-    <ImageTagsTaxHTField xmlns="71af3243-3dd4-4a8d-8c0d-dd76da1f02a5">
-      <Terms xmlns="http://schemas.microsoft.com/office/infopath/2007/PartnerControls"/>
-    </ImageTagsTaxHTField>
-    <TaxCatchAll xmlns="230e9df3-be65-4c73-a93b-d1236ebd677e"/>
-    <MediaServiceKeyPoints xmlns="71af3243-3dd4-4a8d-8c0d-dd76da1f02a5" xsi:nil="true"/>
-  </documentManagement>
-</p:properties>
-</file>
-
 <file path=customXml/itemProps1.xml><?xml version="1.0" encoding="utf-8"?>
 <ds:datastoreItem xmlns:ds="http://schemas.openxmlformats.org/officeDocument/2006/customXml" ds:itemID="{E3D3B2D6-6B1C-4F64-807F-0FF223861F6A}">
   <ds:schemaRefs>
@@ -24293,6 +24287,18 @@
 </file>
 
 <file path=customXml/itemProps2.xml><?xml version="1.0" encoding="utf-8"?>
+<ds:datastoreItem xmlns:ds="http://schemas.openxmlformats.org/officeDocument/2006/customXml" ds:itemID="{33A5D3A3-379F-4885-9B8F-586D59BB1A84}">
+  <ds:schemaRefs>
+    <ds:schemaRef ds:uri="http://schemas.microsoft.com/office/2006/metadata/properties"/>
+    <ds:schemaRef ds:uri="http://schemas.microsoft.com/office/infopath/2007/PartnerControls"/>
+    <ds:schemaRef ds:uri="71af3243-3dd4-4a8d-8c0d-dd76da1f02a5"/>
+    <ds:schemaRef ds:uri="http://schemas.microsoft.com/sharepoint/v3"/>
+    <ds:schemaRef ds:uri="230e9df3-be65-4c73-a93b-d1236ebd677e"/>
+  </ds:schemaRefs>
+</ds:datastoreItem>
+</file>
+
+<file path=customXml/itemProps3.xml><?xml version="1.0" encoding="utf-8"?>
 <ds:datastoreItem xmlns:ds="http://schemas.openxmlformats.org/officeDocument/2006/customXml" ds:itemID="{A5580B19-6BDD-4CE4-B66E-A7A0D928F631}">
   <ds:schemaRefs>
     <ds:schemaRef ds:uri="http://schemas.microsoft.com/office/2006/metadata/contentType"/>
@@ -24311,16 +24317,4 @@
     <ds:schemaRef ds:uri="http://schemas.microsoft.com/internal/obd"/>
   </ds:schemaRefs>
 </ds:datastoreItem>
-</file>
-
-<file path=customXml/itemProps3.xml><?xml version="1.0" encoding="utf-8"?>
-<ds:datastoreItem xmlns:ds="http://schemas.openxmlformats.org/officeDocument/2006/customXml" ds:itemID="{33A5D3A3-379F-4885-9B8F-586D59BB1A84}">
-  <ds:schemaRefs>
-    <ds:schemaRef ds:uri="http://schemas.microsoft.com/office/2006/metadata/properties"/>
-    <ds:schemaRef ds:uri="http://schemas.microsoft.com/office/infopath/2007/PartnerControls"/>
-    <ds:schemaRef ds:uri="71af3243-3dd4-4a8d-8c0d-dd76da1f02a5"/>
-    <ds:schemaRef ds:uri="http://schemas.microsoft.com/sharepoint/v3"/>
-    <ds:schemaRef ds:uri="230e9df3-be65-4c73-a93b-d1236ebd677e"/>
-  </ds:schemaRefs>
-</ds:datastoreItem>
 </file>
</xml_diff>